<commit_message>
Sync with main SVN repo.
New features include alarm monitoring, alarm filtering, Find (CTRL-F)
and other minor improvements.
</commit_message>
<xml_diff>
--- a/TestMonitoringTool.pptx
+++ b/TestMonitoringTool.pptx
@@ -162,7 +162,7 @@
           <c:xMode val="edge"/>
           <c:yMode val="edge"/>
           <c:x val="6.1442243961929002E-2"/>
-          <c:y val="0.11695680206318525"/>
+          <c:y val="0.11695680206318533"/>
           <c:w val="0.93834049152946863"/>
           <c:h val="0.70719099184168699"/>
         </c:manualLayout>
@@ -446,12 +446,11 @@
             </c:numRef>
           </c:val>
         </c:ser>
-        <c:dLbls/>
-        <c:axId val="60583296"/>
-        <c:axId val="61674624"/>
+        <c:axId val="60255616"/>
+        <c:axId val="60564608"/>
       </c:barChart>
       <c:catAx>
-        <c:axId val="60583296"/>
+        <c:axId val="60255616"/>
         <c:scaling>
           <c:orientation val="minMax"/>
         </c:scaling>
@@ -467,14 +466,14 @@
             <a:endParaRPr lang="en-US"/>
           </a:p>
         </c:txPr>
-        <c:crossAx val="61674624"/>
+        <c:crossAx val="60564608"/>
         <c:crosses val="autoZero"/>
         <c:auto val="1"/>
         <c:lblAlgn val="ctr"/>
         <c:lblOffset val="100"/>
       </c:catAx>
       <c:valAx>
-        <c:axId val="61674624"/>
+        <c:axId val="60564608"/>
         <c:scaling>
           <c:orientation val="minMax"/>
         </c:scaling>
@@ -491,7 +490,7 @@
             <a:endParaRPr lang="en-US"/>
           </a:p>
         </c:txPr>
-        <c:crossAx val="60583296"/>
+        <c:crossAx val="60255616"/>
         <c:crosses val="autoZero"/>
         <c:crossBetween val="between"/>
       </c:valAx>
@@ -5442,8 +5441,8 @@
         </p:nvSpPr>
         <p:spPr bwMode="auto">
           <a:xfrm>
-            <a:off x="381000" y="5207000"/>
-            <a:ext cx="6705600" cy="381000"/>
+            <a:off x="381000" y="5926175"/>
+            <a:ext cx="4201633" cy="381000"/>
           </a:xfrm>
           <a:prstGeom prst="rect">
             <a:avLst/>
@@ -5664,6 +5663,36 @@
           </a:p>
         </p:txBody>
       </p:sp>
+      <p:sp>
+        <p:nvSpPr>
+          <p:cNvPr id="2" name="TextBox 1"/>
+          <p:cNvSpPr txBox="1"/>
+          <p:nvPr/>
+        </p:nvSpPr>
+        <p:spPr>
+          <a:xfrm>
+            <a:off x="381000" y="3944679"/>
+            <a:ext cx="4020879" cy="1015663"/>
+          </a:xfrm>
+          <a:prstGeom prst="rect">
+            <a:avLst/>
+          </a:prstGeom>
+          <a:noFill/>
+        </p:spPr>
+        <p:txBody>
+          <a:bodyPr wrap="square" rtlCol="0">
+            <a:spAutoFit/>
+          </a:bodyPr>
+          <a:lstStyle/>
+          <a:p>
+            <a:r>
+              <a:rPr lang="en-US" sz="2000" i="1" dirty="0" smtClean="0"/>
+              <a:t>Single App to monitor several servers for exceptions and alarms during testing!</a:t>
+            </a:r>
+            <a:endParaRPr lang="en-US" sz="2000" i="1" dirty="0"/>
+          </a:p>
+        </p:txBody>
+      </p:sp>
     </p:spTree>
   </p:cSld>
   <p:clrMapOvr>
@@ -5779,21 +5808,6 @@
         <p:txBody>
           <a:bodyPr/>
           <a:lstStyle/>
-          <a:p>
-            <a:r>
-              <a:rPr lang="en-US" sz="1800" dirty="0" smtClean="0"/>
-              <a:t>Created by </a:t>
-            </a:r>
-            <a:r>
-              <a:rPr lang="en-US" sz="1800" dirty="0"/>
-              <a:t>system test intern, </a:t>
-            </a:r>
-            <a:r>
-              <a:rPr lang="en-CA" sz="1800" dirty="0" smtClean="0"/>
-              <a:t>Christian Artin; supervised by Khang Dang</a:t>
-            </a:r>
-            <a:endParaRPr lang="en-US" sz="1800" dirty="0"/>
-          </a:p>
           <a:p>
             <a:r>
               <a:rPr lang="en-US" sz="1800" dirty="0" smtClean="0"/>
@@ -6000,8 +6014,8 @@
         </p:nvSpPr>
         <p:spPr>
           <a:xfrm>
-            <a:off x="350874" y="1662645"/>
-            <a:ext cx="3157870" cy="4463517"/>
+            <a:off x="350874" y="1403498"/>
+            <a:ext cx="3157870" cy="4722665"/>
           </a:xfrm>
         </p:spPr>
         <p:txBody>
@@ -6018,6 +6032,25 @@
               <a:rPr lang="en-CA" sz="1400" dirty="0" smtClean="0"/>
               <a:t>Use pre-defined templates to monitor for exceptions, or create new ones:</a:t>
             </a:r>
+          </a:p>
+          <a:p>
+            <a:pPr marL="0" indent="0">
+              <a:lnSpc>
+                <a:spcPct val="100000"/>
+              </a:lnSpc>
+              <a:buNone/>
+            </a:pPr>
+            <a:r>
+              <a:rPr lang="en-CA" sz="1400" dirty="0" smtClean="0"/>
+              <a:t>Go to the preferences (Edit </a:t>
+            </a:r>
+            <a:r>
+              <a:rPr lang="en-CA" sz="1400" dirty="0" smtClean="0">
+                <a:sym typeface="Wingdings" pitchFamily="2" charset="2"/>
+              </a:rPr>
+              <a:t> Preferences) and to the Template Log Files tab</a:t>
+            </a:r>
+            <a:endParaRPr lang="en-CA" sz="1400" dirty="0" smtClean="0"/>
           </a:p>
           <a:p>
             <a:pPr>
@@ -6029,15 +6062,8 @@
             </a:pPr>
             <a:r>
               <a:rPr lang="en-CA" sz="1400" dirty="0" smtClean="0"/>
-              <a:t>Go to the preferences (Edit </a:t>
-            </a:r>
-            <a:r>
-              <a:rPr lang="en-CA" sz="1400" dirty="0" smtClean="0">
-                <a:sym typeface="Wingdings" pitchFamily="2" charset="2"/>
-              </a:rPr>
-              <a:t> Preferences) and to the Template Log Files tab</a:t>
-            </a:r>
-            <a:endParaRPr lang="en-CA" sz="1400" dirty="0" smtClean="0"/>
+              <a:t>Click Add to create new templates or select an existing one to modify</a:t>
+            </a:r>
           </a:p>
           <a:p>
             <a:pPr>
@@ -6049,7 +6075,23 @@
             </a:pPr>
             <a:r>
               <a:rPr lang="en-CA" sz="1400" dirty="0" smtClean="0"/>
-              <a:t>Create new templates or modify existing ones</a:t>
+              <a:t>Set the path and prefix of the log filename to monitor (ex.: </a:t>
+            </a:r>
+            <a:r>
+              <a:rPr lang="en-CA" sz="1400" dirty="0" err="1" smtClean="0"/>
+              <a:t>XSLog</a:t>
+            </a:r>
+            <a:r>
+              <a:rPr lang="en-CA" sz="1400" dirty="0" smtClean="0"/>
+              <a:t> for a file that would be called </a:t>
+            </a:r>
+            <a:r>
+              <a:rPr lang="en-CA" sz="1400" dirty="0" err="1" smtClean="0"/>
+              <a:t>XSLog</a:t>
+            </a:r>
+            <a:r>
+              <a:rPr lang="en-CA" sz="1400" dirty="0" smtClean="0"/>
+              <a:t>[Date]-[Hour].txt)</a:t>
             </a:r>
           </a:p>
           <a:p>
@@ -6062,36 +6104,7 @@
             </a:pPr>
             <a:r>
               <a:rPr lang="en-CA" sz="1400" dirty="0" smtClean="0"/>
-              <a:t>Set the path and prefix of the log filename to monitor (ex.: </a:t>
-            </a:r>
-            <a:r>
-              <a:rPr lang="en-CA" sz="1400" dirty="0" err="1" smtClean="0"/>
-              <a:t>XSLog</a:t>
-            </a:r>
-            <a:r>
-              <a:rPr lang="en-CA" sz="1400" dirty="0" smtClean="0"/>
-              <a:t> for a file that would be called </a:t>
-            </a:r>
-            <a:r>
-              <a:rPr lang="en-CA" sz="1400" dirty="0" err="1" smtClean="0"/>
-              <a:t>XSLog</a:t>
-            </a:r>
-            <a:r>
-              <a:rPr lang="en-CA" sz="1400" dirty="0" smtClean="0"/>
-              <a:t>[Date]-[Hour].txt)</a:t>
-            </a:r>
-          </a:p>
-          <a:p>
-            <a:pPr>
-              <a:lnSpc>
-                <a:spcPct val="100000"/>
-              </a:lnSpc>
-              <a:buFont typeface="+mj-lt"/>
-              <a:buAutoNum type="arabicPeriod"/>
-            </a:pPr>
-            <a:r>
-              <a:rPr lang="en-CA" sz="1400" dirty="0" smtClean="0"/>
-              <a:t>Add keyword filters to the selected log file. Filters determine which messages will be displayed on screen</a:t>
+              <a:t>Add filters to watch for specific keyword in the selected log file. Filters determine which messages will be displayed on screen</a:t>
             </a:r>
           </a:p>
           <a:p>
@@ -6169,7 +6182,7 @@
         </p:blipFill>
         <p:spPr bwMode="auto">
           <a:xfrm>
-            <a:off x="3595617" y="1658679"/>
+            <a:off x="3595617" y="1562986"/>
             <a:ext cx="5367629" cy="3932718"/>
           </a:xfrm>
           <a:prstGeom prst="rect">
@@ -6178,6 +6191,174 @@
           <a:noFill/>
         </p:spPr>
       </p:pic>
+      <p:sp>
+        <p:nvSpPr>
+          <p:cNvPr id="7" name="Oval 6"/>
+          <p:cNvSpPr/>
+          <p:nvPr/>
+        </p:nvSpPr>
+        <p:spPr>
+          <a:xfrm>
+            <a:off x="3946541" y="4664132"/>
+            <a:ext cx="357784" cy="335878"/>
+          </a:xfrm>
+          <a:prstGeom prst="ellipse">
+            <a:avLst/>
+          </a:prstGeom>
+          <a:solidFill>
+            <a:schemeClr val="accent5">
+              <a:alpha val="68000"/>
+            </a:schemeClr>
+          </a:solidFill>
+          <a:ln>
+            <a:solidFill>
+              <a:schemeClr val="accent5">
+                <a:lumMod val="50000"/>
+              </a:schemeClr>
+            </a:solidFill>
+          </a:ln>
+        </p:spPr>
+        <p:style>
+          <a:lnRef idx="2">
+            <a:schemeClr val="accent1">
+              <a:shade val="50000"/>
+            </a:schemeClr>
+          </a:lnRef>
+          <a:fillRef idx="1">
+            <a:schemeClr val="accent1"/>
+          </a:fillRef>
+          <a:effectRef idx="0">
+            <a:schemeClr val="accent1"/>
+          </a:effectRef>
+          <a:fontRef idx="minor">
+            <a:schemeClr val="lt1"/>
+          </a:fontRef>
+        </p:style>
+        <p:txBody>
+          <a:bodyPr rtlCol="0" anchor="ctr"/>
+          <a:lstStyle/>
+          <a:p>
+            <a:pPr algn="ctr"/>
+            <a:r>
+              <a:rPr lang="en-US" dirty="0" smtClean="0"/>
+              <a:t>1</a:t>
+            </a:r>
+            <a:endParaRPr lang="en-US" dirty="0"/>
+          </a:p>
+        </p:txBody>
+      </p:sp>
+      <p:sp>
+        <p:nvSpPr>
+          <p:cNvPr id="8" name="Oval 7"/>
+          <p:cNvSpPr/>
+          <p:nvPr/>
+        </p:nvSpPr>
+        <p:spPr>
+          <a:xfrm>
+            <a:off x="5921647" y="2349779"/>
+            <a:ext cx="357784" cy="335878"/>
+          </a:xfrm>
+          <a:prstGeom prst="ellipse">
+            <a:avLst/>
+          </a:prstGeom>
+          <a:solidFill>
+            <a:schemeClr val="accent5">
+              <a:alpha val="68000"/>
+            </a:schemeClr>
+          </a:solidFill>
+          <a:ln>
+            <a:solidFill>
+              <a:schemeClr val="accent5">
+                <a:lumMod val="50000"/>
+              </a:schemeClr>
+            </a:solidFill>
+          </a:ln>
+        </p:spPr>
+        <p:style>
+          <a:lnRef idx="2">
+            <a:schemeClr val="accent1">
+              <a:shade val="50000"/>
+            </a:schemeClr>
+          </a:lnRef>
+          <a:fillRef idx="1">
+            <a:schemeClr val="accent1"/>
+          </a:fillRef>
+          <a:effectRef idx="0">
+            <a:schemeClr val="accent1"/>
+          </a:effectRef>
+          <a:fontRef idx="minor">
+            <a:schemeClr val="lt1"/>
+          </a:fontRef>
+        </p:style>
+        <p:txBody>
+          <a:bodyPr rtlCol="0" anchor="ctr"/>
+          <a:lstStyle/>
+          <a:p>
+            <a:pPr algn="ctr"/>
+            <a:r>
+              <a:rPr lang="en-US" dirty="0" smtClean="0"/>
+              <a:t>2</a:t>
+            </a:r>
+            <a:endParaRPr lang="en-US" dirty="0"/>
+          </a:p>
+        </p:txBody>
+      </p:sp>
+      <p:sp>
+        <p:nvSpPr>
+          <p:cNvPr id="9" name="Oval 8"/>
+          <p:cNvSpPr/>
+          <p:nvPr/>
+        </p:nvSpPr>
+        <p:spPr>
+          <a:xfrm>
+            <a:off x="6802976" y="4557142"/>
+            <a:ext cx="357784" cy="335878"/>
+          </a:xfrm>
+          <a:prstGeom prst="ellipse">
+            <a:avLst/>
+          </a:prstGeom>
+          <a:solidFill>
+            <a:schemeClr val="accent5">
+              <a:alpha val="68000"/>
+            </a:schemeClr>
+          </a:solidFill>
+          <a:ln>
+            <a:solidFill>
+              <a:schemeClr val="accent5">
+                <a:lumMod val="50000"/>
+              </a:schemeClr>
+            </a:solidFill>
+          </a:ln>
+        </p:spPr>
+        <p:style>
+          <a:lnRef idx="2">
+            <a:schemeClr val="accent1">
+              <a:shade val="50000"/>
+            </a:schemeClr>
+          </a:lnRef>
+          <a:fillRef idx="1">
+            <a:schemeClr val="accent1"/>
+          </a:fillRef>
+          <a:effectRef idx="0">
+            <a:schemeClr val="accent1"/>
+          </a:effectRef>
+          <a:fontRef idx="minor">
+            <a:schemeClr val="lt1"/>
+          </a:fontRef>
+        </p:style>
+        <p:txBody>
+          <a:bodyPr rtlCol="0" anchor="ctr"/>
+          <a:lstStyle/>
+          <a:p>
+            <a:pPr algn="ctr"/>
+            <a:r>
+              <a:rPr lang="en-US" dirty="0" smtClean="0"/>
+              <a:t>3</a:t>
+            </a:r>
+            <a:endParaRPr lang="en-US" dirty="0"/>
+          </a:p>
+        </p:txBody>
+      </p:sp>
     </p:spTree>
     <p:extLst>
       <p:ext uri="{BB962C8B-B14F-4D97-AF65-F5344CB8AC3E}">
@@ -6217,7 +6398,7 @@
       </p:grpSpPr>
       <p:pic>
         <p:nvPicPr>
-          <p:cNvPr id="2053" name="Picture 5"/>
+          <p:cNvPr id="1026" name="Picture 2"/>
           <p:cNvPicPr>
             <a:picLocks noChangeAspect="1" noChangeArrowheads="1"/>
           </p:cNvPicPr>
@@ -6238,8 +6419,8 @@
         </p:blipFill>
         <p:spPr bwMode="auto">
           <a:xfrm>
-            <a:off x="3147237" y="1454516"/>
-            <a:ext cx="5784185" cy="4922139"/>
+            <a:off x="3147237" y="1488559"/>
+            <a:ext cx="5838936" cy="4299803"/>
           </a:xfrm>
           <a:prstGeom prst="rect">
             <a:avLst/>
@@ -6322,7 +6503,15 @@
             </a:pPr>
             <a:r>
               <a:rPr lang="en-CA" sz="1400" dirty="0" smtClean="0"/>
-              <a:t>Add a server you want to monitor</a:t>
+              <a:t>Click </a:t>
+            </a:r>
+            <a:r>
+              <a:rPr lang="en-CA" sz="1400" dirty="0" smtClean="0"/>
+              <a:t>Add to create a </a:t>
+            </a:r>
+            <a:r>
+              <a:rPr lang="en-CA" sz="1400" dirty="0" smtClean="0"/>
+              <a:t>server you want to monitor</a:t>
             </a:r>
           </a:p>
           <a:p>
@@ -6332,7 +6521,7 @@
             </a:pPr>
             <a:r>
               <a:rPr lang="en-CA" sz="1400" dirty="0" smtClean="0"/>
-              <a:t>Assign log files to the selected server (which correspond to the templates you created in the previous step)</a:t>
+              <a:t>Select log files to monitor (which correspond to the templates you created in the previous step)</a:t>
             </a:r>
           </a:p>
           <a:p>
@@ -6464,7 +6653,7 @@
         </p:nvSpPr>
         <p:spPr>
           <a:xfrm>
-            <a:off x="5474086" y="2662154"/>
+            <a:off x="5750532" y="2545196"/>
             <a:ext cx="357784" cy="335878"/>
           </a:xfrm>
           <a:prstGeom prst="ellipse">
@@ -6512,6 +6701,60 @@
           </a:p>
         </p:txBody>
       </p:sp>
+      <p:pic>
+        <p:nvPicPr>
+          <p:cNvPr id="1027" name="Picture 3"/>
+          <p:cNvPicPr>
+            <a:picLocks noChangeAspect="1" noChangeArrowheads="1"/>
+          </p:cNvPicPr>
+          <p:nvPr/>
+        </p:nvPicPr>
+        <p:blipFill>
+          <a:blip r:embed="rId3" cstate="print">
+            <a:extLst>
+              <a:ext uri="{28A0092B-C50C-407E-A947-70E740481C1C}">
+                <a14:useLocalDpi xmlns:a14="http://schemas.microsoft.com/office/drawing/2010/main" xmlns="" val="0"/>
+              </a:ext>
+            </a:extLst>
+          </a:blip>
+          <a:srcRect/>
+          <a:stretch>
+            <a:fillRect/>
+          </a:stretch>
+        </p:blipFill>
+        <p:spPr bwMode="auto">
+          <a:xfrm>
+            <a:off x="4628909" y="3566600"/>
+            <a:ext cx="2535685" cy="2812935"/>
+          </a:xfrm>
+          <a:prstGeom prst="rect">
+            <a:avLst/>
+          </a:prstGeom>
+          <a:noFill/>
+          <a:ln>
+            <a:noFill/>
+          </a:ln>
+          <a:extLst>
+            <a:ext uri="{909E8E84-426E-40DD-AFC4-6F175D3DCCD1}">
+              <a14:hiddenFill xmlns:a14="http://schemas.microsoft.com/office/drawing/2010/main" xmlns="">
+                <a:solidFill>
+                  <a:schemeClr val="accent1"/>
+                </a:solidFill>
+              </a14:hiddenFill>
+            </a:ext>
+            <a:ext uri="{91240B29-F687-4F45-9708-019B960494DF}">
+              <a14:hiddenLine xmlns:a14="http://schemas.microsoft.com/office/drawing/2010/main" xmlns="" w="9525">
+                <a:solidFill>
+                  <a:schemeClr val="tx1"/>
+                </a:solidFill>
+                <a:miter lim="800000"/>
+                <a:headEnd/>
+                <a:tailEnd/>
+              </a14:hiddenLine>
+            </a:ext>
+          </a:extLst>
+        </p:spPr>
+      </p:pic>
       <p:sp>
         <p:nvSpPr>
           <p:cNvPr id="13" name="Oval 12"/>
@@ -6520,7 +6763,7 @@
         </p:nvSpPr>
         <p:spPr>
           <a:xfrm>
-            <a:off x="6960962" y="4661006"/>
+            <a:off x="5753336" y="4471367"/>
             <a:ext cx="357784" cy="335878"/>
           </a:xfrm>
           <a:prstGeom prst="ellipse">
@@ -6811,6 +7054,56 @@
           </a:extLst>
         </p:spPr>
       </p:pic>
+      <p:sp>
+        <p:nvSpPr>
+          <p:cNvPr id="9" name="Oval 8"/>
+          <p:cNvSpPr/>
+          <p:nvPr/>
+        </p:nvSpPr>
+        <p:spPr>
+          <a:xfrm>
+            <a:off x="7198242" y="1688023"/>
+            <a:ext cx="563524" cy="550505"/>
+          </a:xfrm>
+          <a:prstGeom prst="ellipse">
+            <a:avLst/>
+          </a:prstGeom>
+          <a:solidFill>
+            <a:schemeClr val="accent5">
+              <a:alpha val="10000"/>
+            </a:schemeClr>
+          </a:solidFill>
+          <a:ln>
+            <a:solidFill>
+              <a:srgbClr val="FF0000"/>
+            </a:solidFill>
+          </a:ln>
+        </p:spPr>
+        <p:style>
+          <a:lnRef idx="2">
+            <a:schemeClr val="accent1">
+              <a:shade val="50000"/>
+            </a:schemeClr>
+          </a:lnRef>
+          <a:fillRef idx="1">
+            <a:schemeClr val="accent1"/>
+          </a:fillRef>
+          <a:effectRef idx="0">
+            <a:schemeClr val="accent1"/>
+          </a:effectRef>
+          <a:fontRef idx="minor">
+            <a:schemeClr val="lt1"/>
+          </a:fontRef>
+        </p:style>
+        <p:txBody>
+          <a:bodyPr rtlCol="0" anchor="ctr"/>
+          <a:lstStyle/>
+          <a:p>
+            <a:pPr algn="ctr"/>
+            <a:endParaRPr lang="en-US" dirty="0"/>
+          </a:p>
+        </p:txBody>
+      </p:sp>
     </p:spTree>
     <p:extLst>
       <p:ext uri="{BB962C8B-B14F-4D97-AF65-F5344CB8AC3E}">
@@ -7134,6 +7427,20 @@
           <a:lstStyle/>
           <a:p>
             <a:r>
+              <a:rPr lang="en-US" sz="1800" dirty="0"/>
+              <a:t>Created by system test intern, </a:t>
+            </a:r>
+            <a:r>
+              <a:rPr lang="en-CA" sz="1800" dirty="0"/>
+              <a:t>Christian Artin; supervised by Khang Dang</a:t>
+            </a:r>
+            <a:endParaRPr lang="en-US" sz="1800" dirty="0"/>
+          </a:p>
+          <a:p>
+            <a:endParaRPr lang="en-CA" sz="1800" dirty="0" smtClean="0"/>
+          </a:p>
+          <a:p>
+            <a:r>
               <a:rPr lang="en-CA" sz="1800" dirty="0" smtClean="0"/>
               <a:t>Preferences are only saved to disk if you press OK. They are not always backward compatible.</a:t>
             </a:r>
@@ -7164,14 +7471,6 @@
               <a:rPr lang="en-CA" sz="1600" dirty="0" smtClean="0"/>
               <a:t>Preferences are only saved when the focus from the text box is lost (i.e. you cannot click on another item in the list while modifying the name of the currently selected item)</a:t>
             </a:r>
-          </a:p>
-          <a:p>
-            <a:pPr lvl="1"/>
-            <a:r>
-              <a:rPr lang="en-CA" sz="1600" dirty="0" smtClean="0"/>
-              <a:t>Scrolling behavior becomes erratic once the number of lines reaches the limit</a:t>
-            </a:r>
-            <a:endParaRPr lang="en-US" sz="1600" dirty="0" smtClean="0"/>
           </a:p>
           <a:p>
             <a:r>
@@ -7266,7 +7565,12 @@
             <p:ph type="ctrTitle"/>
           </p:nvPr>
         </p:nvSpPr>
-        <p:spPr/>
+        <p:spPr>
+          <a:xfrm>
+            <a:off x="152400" y="2739993"/>
+            <a:ext cx="6705600" cy="457200"/>
+          </a:xfrm>
+        </p:spPr>
         <p:txBody>
           <a:bodyPr/>
           <a:lstStyle/>
@@ -7275,25 +7579,6 @@
               <a:rPr lang="en-US" dirty="0" smtClean="0"/>
               <a:t>Thank you for using this tool!</a:t>
             </a:r>
-            <a:endParaRPr lang="en-US" dirty="0"/>
-          </a:p>
-        </p:txBody>
-      </p:sp>
-      <p:sp>
-        <p:nvSpPr>
-          <p:cNvPr id="8" name="Subtitle 7"/>
-          <p:cNvSpPr>
-            <a:spLocks noGrp="1"/>
-          </p:cNvSpPr>
-          <p:nvPr>
-            <p:ph type="subTitle" idx="1"/>
-          </p:nvPr>
-        </p:nvSpPr>
-        <p:spPr/>
-        <p:txBody>
-          <a:bodyPr/>
-          <a:lstStyle/>
-          <a:p>
             <a:endParaRPr lang="en-US" dirty="0"/>
           </a:p>
         </p:txBody>

</xml_diff>